<commit_message>
HL implementation voice part in PPT completed
</commit_message>
<xml_diff>
--- a/Pr�sentation/Echo Cancellation_temp_HL_voice.pptx
+++ b/Pr�sentation/Echo Cancellation_temp_HL_voice.pptx
@@ -5,16 +5,14 @@
     <p:sldMasterId id="2147483648" r:id="rId1"/>
   </p:sldMasterIdLst>
   <p:sldIdLst>
-    <p:sldId id="256" r:id="rId2"/>
-    <p:sldId id="257" r:id="rId3"/>
-    <p:sldId id="263" r:id="rId4"/>
-    <p:sldId id="258" r:id="rId5"/>
-    <p:sldId id="262" r:id="rId6"/>
-    <p:sldId id="259" r:id="rId7"/>
-    <p:sldId id="260" r:id="rId8"/>
-    <p:sldId id="261" r:id="rId9"/>
-    <p:sldId id="264" r:id="rId10"/>
-    <p:sldId id="265" r:id="rId11"/>
+    <p:sldId id="259" r:id="rId2"/>
+    <p:sldId id="260" r:id="rId3"/>
+    <p:sldId id="261" r:id="rId4"/>
+    <p:sldId id="266" r:id="rId5"/>
+    <p:sldId id="265" r:id="rId6"/>
+    <p:sldId id="267" r:id="rId7"/>
+    <p:sldId id="264" r:id="rId8"/>
+    <p:sldId id="268" r:id="rId9"/>
   </p:sldIdLst>
   <p:sldSz cx="9144000" cy="6858000" type="screen4x3"/>
   <p:notesSz cx="6858000" cy="9144000"/>
@@ -3075,21 +3073,33 @@
             <a:spLocks noGrp="1"/>
           </p:cNvSpPr>
           <p:nvPr>
-            <p:ph type="ctrTitle"/>
-          </p:nvPr>
-        </p:nvSpPr>
-        <p:spPr/>
-        <p:txBody>
-          <a:bodyPr/>
-          <a:lstStyle/>
-          <a:p>
-            <a:r>
-              <a:rPr lang="de-CH" dirty="0" smtClean="0"/>
-              <a:t>Echo </a:t>
-            </a:r>
+            <p:ph type="title"/>
+          </p:nvPr>
+        </p:nvSpPr>
+        <p:spPr/>
+        <p:txBody>
+          <a:bodyPr/>
+          <a:lstStyle/>
+          <a:p>
             <a:r>
               <a:rPr lang="de-CH" dirty="0" err="1" smtClean="0"/>
-              <a:t>Cancellation</a:t>
+              <a:t>Implementation</a:t>
+            </a:r>
+            <a:r>
+              <a:rPr lang="de-CH" dirty="0" smtClean="0"/>
+              <a:t> </a:t>
+            </a:r>
+            <a:r>
+              <a:rPr lang="de-CH" dirty="0" smtClean="0"/>
+              <a:t>HL (</a:t>
+            </a:r>
+            <a:r>
+              <a:rPr lang="de-CH" dirty="0" err="1" smtClean="0"/>
+              <a:t>noise</a:t>
+            </a:r>
+            <a:r>
+              <a:rPr lang="de-CH" dirty="0" smtClean="0"/>
+              <a:t>)</a:t>
             </a:r>
             <a:endParaRPr lang="de-CH" dirty="0"/>
           </a:p>
@@ -3097,20 +3107,56 @@
       </p:sp>
       <p:sp>
         <p:nvSpPr>
-          <p:cNvPr id="3" name="Untertitel 2"/>
-          <p:cNvSpPr>
-            <a:spLocks noGrp="1"/>
-          </p:cNvSpPr>
-          <p:nvPr>
-            <p:ph type="subTitle" idx="1"/>
-          </p:nvPr>
-        </p:nvSpPr>
-        <p:spPr/>
-        <p:txBody>
-          <a:bodyPr/>
-          <a:lstStyle/>
-          <a:p>
-            <a:endParaRPr lang="de-CH"/>
+          <p:cNvPr id="3" name="Inhaltsplatzhalter 2"/>
+          <p:cNvSpPr>
+            <a:spLocks noGrp="1"/>
+          </p:cNvSpPr>
+          <p:nvPr>
+            <p:ph idx="1"/>
+          </p:nvPr>
+        </p:nvSpPr>
+        <p:spPr/>
+        <p:txBody>
+          <a:bodyPr/>
+          <a:lstStyle/>
+          <a:p>
+            <a:r>
+              <a:rPr lang="de-CH" dirty="0" smtClean="0"/>
+              <a:t>Weisses Rauschen</a:t>
+            </a:r>
+          </a:p>
+          <a:p>
+            <a:r>
+              <a:rPr lang="de-CH" dirty="0" smtClean="0"/>
+              <a:t>Echo ist eine Verzögerung um 8 Samples und Amplitude von 0.4:</a:t>
+            </a:r>
+          </a:p>
+          <a:p>
+            <a:pPr lvl="1"/>
+            <a:r>
+              <a:rPr lang="de-CH" dirty="0" smtClean="0"/>
+              <a:t>g = [1 0 0 0 0 0 0 0.4]</a:t>
+            </a:r>
+          </a:p>
+          <a:p>
+            <a:r>
+              <a:rPr lang="de-CH" dirty="0" smtClean="0"/>
+              <a:t>Konvergenzgeschwindigkeit ist abhängig von u</a:t>
+            </a:r>
+          </a:p>
+          <a:p>
+            <a:pPr lvl="1"/>
+            <a:r>
+              <a:rPr lang="de-CH" dirty="0" smtClean="0"/>
+              <a:t>u klein: genau aber langsam</a:t>
+            </a:r>
+          </a:p>
+          <a:p>
+            <a:pPr lvl="1"/>
+            <a:r>
+              <a:rPr lang="de-CH" dirty="0" smtClean="0"/>
+              <a:t>u gross: schnell aber ungenau (und evtl. unstabil)</a:t>
+            </a:r>
           </a:p>
         </p:txBody>
       </p:sp>
@@ -3129,7 +3175,7 @@
 </p:sld>
 </file>
 
-<file path=ppt/slides/slide10.xml><?xml version="1.0" encoding="utf-8"?>
+<file path=ppt/slides/slide2.xml><?xml version="1.0" encoding="utf-8"?>
 <p:sld xmlns:a="http://schemas.openxmlformats.org/drawingml/2006/main" xmlns:r="http://schemas.openxmlformats.org/officeDocument/2006/relationships" xmlns:p="http://schemas.openxmlformats.org/presentationml/2006/main">
   <p:cSld>
     <p:spTree>
@@ -3163,12 +3209,68 @@
           <a:p>
             <a:r>
               <a:rPr lang="de-CH" dirty="0" smtClean="0"/>
-              <a:t>Resultate HL</a:t>
+              <a:t>Resultate </a:t>
+            </a:r>
+            <a:r>
+              <a:rPr lang="de-CH" dirty="0" smtClean="0"/>
+              <a:t>HL (Noise)</a:t>
             </a:r>
             <a:endParaRPr lang="de-CH" dirty="0"/>
           </a:p>
         </p:txBody>
       </p:sp>
+      <p:pic>
+        <p:nvPicPr>
+          <p:cNvPr id="16386" name="Picture 2" descr="D:\BFH\DSV\EchoCancellation\Präsentation\Konvergenz_u_tief_0.00008.png"/>
+          <p:cNvPicPr>
+            <a:picLocks noChangeAspect="1" noChangeArrowheads="1"/>
+          </p:cNvPicPr>
+          <p:nvPr/>
+        </p:nvPicPr>
+        <p:blipFill>
+          <a:blip r:embed="rId2" cstate="print"/>
+          <a:srcRect/>
+          <a:stretch>
+            <a:fillRect/>
+          </a:stretch>
+        </p:blipFill>
+        <p:spPr bwMode="auto">
+          <a:xfrm>
+            <a:off x="-324544" y="1196752"/>
+            <a:ext cx="7920880" cy="3974530"/>
+          </a:xfrm>
+          <a:prstGeom prst="rect">
+            <a:avLst/>
+          </a:prstGeom>
+          <a:noFill/>
+        </p:spPr>
+      </p:pic>
+      <p:pic>
+        <p:nvPicPr>
+          <p:cNvPr id="16387" name="Picture 3" descr="D:\BFH\DSV\EchoCancellation\Präsentation\Koeffizienten_u_tief_0.00008.png"/>
+          <p:cNvPicPr>
+            <a:picLocks noChangeAspect="1" noChangeArrowheads="1"/>
+          </p:cNvPicPr>
+          <p:nvPr/>
+        </p:nvPicPr>
+        <p:blipFill>
+          <a:blip r:embed="rId3" cstate="print"/>
+          <a:srcRect/>
+          <a:stretch>
+            <a:fillRect/>
+          </a:stretch>
+        </p:blipFill>
+        <p:spPr bwMode="auto">
+          <a:xfrm>
+            <a:off x="5874889" y="4437112"/>
+            <a:ext cx="3233615" cy="2420888"/>
+          </a:xfrm>
+          <a:prstGeom prst="rect">
+            <a:avLst/>
+          </a:prstGeom>
+          <a:noFill/>
+        </p:spPr>
+      </p:pic>
       <p:sp>
         <p:nvSpPr>
           <p:cNvPr id="6" name="Textfeld 5"/>
@@ -3200,7 +3302,113 @@
             </a:pPr>
             <a:r>
               <a:rPr lang="de-CH" sz="3200" dirty="0" smtClean="0"/>
-              <a:t>Sprachsignal</a:t>
+              <a:t>Weisses Rauschen</a:t>
+            </a:r>
+          </a:p>
+          <a:p>
+            <a:pPr>
+              <a:buFont typeface="Arial" pitchFamily="34" charset="0"/>
+              <a:buChar char="•"/>
+            </a:pPr>
+            <a:r>
+              <a:rPr lang="de-CH" sz="3200" dirty="0" smtClean="0"/>
+              <a:t>u = 0.00008 (klein)</a:t>
+            </a:r>
+            <a:endParaRPr lang="de-CH" sz="3200" dirty="0"/>
+          </a:p>
+        </p:txBody>
+      </p:sp>
+    </p:spTree>
+  </p:cSld>
+  <p:clrMapOvr>
+    <a:masterClrMapping/>
+  </p:clrMapOvr>
+  <p:timing>
+    <p:tnLst>
+      <p:par>
+        <p:cTn id="1" dur="indefinite" restart="never" nodeType="tmRoot"/>
+      </p:par>
+    </p:tnLst>
+  </p:timing>
+</p:sld>
+</file>
+
+<file path=ppt/slides/slide3.xml><?xml version="1.0" encoding="utf-8"?>
+<p:sld xmlns:a="http://schemas.openxmlformats.org/drawingml/2006/main" xmlns:r="http://schemas.openxmlformats.org/officeDocument/2006/relationships" xmlns:p="http://schemas.openxmlformats.org/presentationml/2006/main">
+  <p:cSld>
+    <p:spTree>
+      <p:nvGrpSpPr>
+        <p:cNvPr id="1" name=""/>
+        <p:cNvGrpSpPr/>
+        <p:nvPr/>
+      </p:nvGrpSpPr>
+      <p:grpSpPr>
+        <a:xfrm>
+          <a:off x="0" y="0"/>
+          <a:ext cx="0" cy="0"/>
+          <a:chOff x="0" y="0"/>
+          <a:chExt cx="0" cy="0"/>
+        </a:xfrm>
+      </p:grpSpPr>
+      <p:sp>
+        <p:nvSpPr>
+          <p:cNvPr id="2" name="Titel 1"/>
+          <p:cNvSpPr>
+            <a:spLocks noGrp="1"/>
+          </p:cNvSpPr>
+          <p:nvPr>
+            <p:ph type="title"/>
+          </p:nvPr>
+        </p:nvSpPr>
+        <p:spPr/>
+        <p:txBody>
+          <a:bodyPr/>
+          <a:lstStyle/>
+          <a:p>
+            <a:r>
+              <a:rPr lang="de-CH" dirty="0" smtClean="0"/>
+              <a:t>Resultate </a:t>
+            </a:r>
+            <a:r>
+              <a:rPr lang="de-CH" dirty="0" smtClean="0"/>
+              <a:t>HL (Noise)</a:t>
+            </a:r>
+            <a:endParaRPr lang="de-CH" dirty="0"/>
+          </a:p>
+        </p:txBody>
+      </p:sp>
+      <p:sp>
+        <p:nvSpPr>
+          <p:cNvPr id="6" name="Textfeld 5"/>
+          <p:cNvSpPr txBox="1"/>
+          <p:nvPr/>
+        </p:nvSpPr>
+        <p:spPr>
+          <a:xfrm>
+            <a:off x="251520" y="5373216"/>
+            <a:ext cx="5688632" cy="1077218"/>
+          </a:xfrm>
+          <a:prstGeom prst="rect">
+            <a:avLst/>
+          </a:prstGeom>
+          <a:noFill/>
+          <a:ln>
+            <a:noFill/>
+          </a:ln>
+        </p:spPr>
+        <p:txBody>
+          <a:bodyPr wrap="square" rtlCol="0">
+            <a:spAutoFit/>
+          </a:bodyPr>
+          <a:lstStyle/>
+          <a:p>
+            <a:pPr>
+              <a:buFont typeface="Arial" pitchFamily="34" charset="0"/>
+              <a:buChar char="•"/>
+            </a:pPr>
+            <a:r>
+              <a:rPr lang="de-CH" sz="3200" dirty="0" smtClean="0"/>
+              <a:t>Weisses Rauschen</a:t>
             </a:r>
           </a:p>
           <a:p>
@@ -3283,230 +3491,6 @@
 </p:sld>
 </file>
 
-<file path=ppt/slides/slide2.xml><?xml version="1.0" encoding="utf-8"?>
-<p:sld xmlns:a="http://schemas.openxmlformats.org/drawingml/2006/main" xmlns:r="http://schemas.openxmlformats.org/officeDocument/2006/relationships" xmlns:p="http://schemas.openxmlformats.org/presentationml/2006/main">
-  <p:cSld>
-    <p:spTree>
-      <p:nvGrpSpPr>
-        <p:cNvPr id="1" name=""/>
-        <p:cNvGrpSpPr/>
-        <p:nvPr/>
-      </p:nvGrpSpPr>
-      <p:grpSpPr>
-        <a:xfrm>
-          <a:off x="0" y="0"/>
-          <a:ext cx="0" cy="0"/>
-          <a:chOff x="0" y="0"/>
-          <a:chExt cx="0" cy="0"/>
-        </a:xfrm>
-      </p:grpSpPr>
-      <p:sp>
-        <p:nvSpPr>
-          <p:cNvPr id="2" name="Titel 1"/>
-          <p:cNvSpPr>
-            <a:spLocks noGrp="1"/>
-          </p:cNvSpPr>
-          <p:nvPr>
-            <p:ph type="title"/>
-          </p:nvPr>
-        </p:nvSpPr>
-        <p:spPr/>
-        <p:txBody>
-          <a:bodyPr/>
-          <a:lstStyle/>
-          <a:p>
-            <a:r>
-              <a:rPr lang="de-CH" dirty="0" smtClean="0"/>
-              <a:t>Problematik</a:t>
-            </a:r>
-            <a:endParaRPr lang="de-CH" dirty="0"/>
-          </a:p>
-        </p:txBody>
-      </p:sp>
-      <p:sp>
-        <p:nvSpPr>
-          <p:cNvPr id="3" name="Inhaltsplatzhalter 2"/>
-          <p:cNvSpPr>
-            <a:spLocks noGrp="1"/>
-          </p:cNvSpPr>
-          <p:nvPr>
-            <p:ph idx="1"/>
-          </p:nvPr>
-        </p:nvSpPr>
-        <p:spPr/>
-        <p:txBody>
-          <a:bodyPr>
-            <a:normAutofit/>
-          </a:bodyPr>
-          <a:lstStyle/>
-          <a:p>
-            <a:r>
-              <a:rPr lang="de-CH" dirty="0" smtClean="0"/>
-              <a:t>Ein Signal x wird mit einem Echo versehen.</a:t>
-            </a:r>
-          </a:p>
-          <a:p>
-            <a:pPr lvl="1"/>
-            <a:r>
-              <a:rPr lang="de-CH" dirty="0" smtClean="0"/>
-              <a:t>Ein Echo ist einfach eine verzögerte und eventuell abgedämpfte Kopie von x.</a:t>
-            </a:r>
-          </a:p>
-          <a:p>
-            <a:r>
-              <a:rPr lang="de-CH" dirty="0" smtClean="0"/>
-              <a:t>Das Signal x und das resultierende Signal y sind bekannt.</a:t>
-            </a:r>
-          </a:p>
-          <a:p>
-            <a:r>
-              <a:rPr lang="de-CH" dirty="0" smtClean="0"/>
-              <a:t>Aus beiden Signalen soll nun die Charakteristik des Echos ermittelt und das ursprüngliche Signal x wiederhergestellt werden.</a:t>
-            </a:r>
-            <a:endParaRPr lang="de-CH" dirty="0"/>
-          </a:p>
-        </p:txBody>
-      </p:sp>
-    </p:spTree>
-  </p:cSld>
-  <p:clrMapOvr>
-    <a:masterClrMapping/>
-  </p:clrMapOvr>
-  <p:timing>
-    <p:tnLst>
-      <p:par>
-        <p:cTn id="1" dur="indefinite" restart="never" nodeType="tmRoot"/>
-      </p:par>
-    </p:tnLst>
-  </p:timing>
-</p:sld>
-</file>
-
-<file path=ppt/slides/slide3.xml><?xml version="1.0" encoding="utf-8"?>
-<p:sld xmlns:a="http://schemas.openxmlformats.org/drawingml/2006/main" xmlns:r="http://schemas.openxmlformats.org/officeDocument/2006/relationships" xmlns:p="http://schemas.openxmlformats.org/presentationml/2006/main">
-  <p:cSld>
-    <p:spTree>
-      <p:nvGrpSpPr>
-        <p:cNvPr id="1" name=""/>
-        <p:cNvGrpSpPr/>
-        <p:nvPr/>
-      </p:nvGrpSpPr>
-      <p:grpSpPr>
-        <a:xfrm>
-          <a:off x="0" y="0"/>
-          <a:ext cx="0" cy="0"/>
-          <a:chOff x="0" y="0"/>
-          <a:chExt cx="0" cy="0"/>
-        </a:xfrm>
-      </p:grpSpPr>
-      <p:sp>
-        <p:nvSpPr>
-          <p:cNvPr id="2" name="Titel 1"/>
-          <p:cNvSpPr>
-            <a:spLocks noGrp="1"/>
-          </p:cNvSpPr>
-          <p:nvPr>
-            <p:ph type="title"/>
-          </p:nvPr>
-        </p:nvSpPr>
-        <p:spPr/>
-        <p:txBody>
-          <a:bodyPr/>
-          <a:lstStyle/>
-          <a:p>
-            <a:r>
-              <a:rPr lang="de-CH" dirty="0" smtClean="0"/>
-              <a:t>Problematik</a:t>
-            </a:r>
-            <a:endParaRPr lang="de-CH" dirty="0"/>
-          </a:p>
-        </p:txBody>
-      </p:sp>
-      <p:sp>
-        <p:nvSpPr>
-          <p:cNvPr id="3" name="Inhaltsplatzhalter 2"/>
-          <p:cNvSpPr>
-            <a:spLocks noGrp="1"/>
-          </p:cNvSpPr>
-          <p:nvPr>
-            <p:ph idx="1"/>
-          </p:nvPr>
-        </p:nvSpPr>
-        <p:spPr/>
-        <p:txBody>
-          <a:bodyPr>
-            <a:normAutofit/>
-          </a:bodyPr>
-          <a:lstStyle/>
-          <a:p>
-            <a:r>
-              <a:rPr lang="de-CH" dirty="0" smtClean="0"/>
-              <a:t>Echo:</a:t>
-            </a:r>
-          </a:p>
-          <a:p>
-            <a:pPr lvl="1"/>
-            <a:r>
-              <a:rPr lang="de-CH" dirty="0" smtClean="0"/>
-              <a:t>Echo-Verzögerung: 8/</a:t>
-            </a:r>
-            <a:r>
-              <a:rPr lang="de-CH" dirty="0" err="1" smtClean="0"/>
-              <a:t>fs</a:t>
-            </a:r>
-            <a:endParaRPr lang="de-CH" dirty="0" smtClean="0"/>
-          </a:p>
-          <a:p>
-            <a:pPr lvl="1"/>
-            <a:r>
-              <a:rPr lang="de-CH" dirty="0" smtClean="0"/>
-              <a:t>Echo-Amplitude: 0.4</a:t>
-            </a:r>
-            <a:endParaRPr lang="de-CH" dirty="0"/>
-          </a:p>
-        </p:txBody>
-      </p:sp>
-      <p:pic>
-        <p:nvPicPr>
-          <p:cNvPr id="2050" name="Picture 2" descr="D:\BFH\DSV\EchoCancellation\Präsentation\g.png"/>
-          <p:cNvPicPr>
-            <a:picLocks noChangeAspect="1" noChangeArrowheads="1"/>
-          </p:cNvPicPr>
-          <p:nvPr/>
-        </p:nvPicPr>
-        <p:blipFill>
-          <a:blip r:embed="rId2" cstate="print"/>
-          <a:srcRect/>
-          <a:stretch>
-            <a:fillRect/>
-          </a:stretch>
-        </p:blipFill>
-        <p:spPr bwMode="auto">
-          <a:xfrm>
-            <a:off x="4174396" y="2956892"/>
-            <a:ext cx="4574068" cy="3424436"/>
-          </a:xfrm>
-          <a:prstGeom prst="rect">
-            <a:avLst/>
-          </a:prstGeom>
-          <a:noFill/>
-        </p:spPr>
-      </p:pic>
-    </p:spTree>
-  </p:cSld>
-  <p:clrMapOvr>
-    <a:masterClrMapping/>
-  </p:clrMapOvr>
-  <p:timing>
-    <p:tnLst>
-      <p:par>
-        <p:cTn id="1" dur="indefinite" restart="never" nodeType="tmRoot"/>
-      </p:par>
-    </p:tnLst>
-  </p:timing>
-</p:sld>
-</file>
-
 <file path=ppt/slides/slide4.xml><?xml version="1.0" encoding="utf-8"?>
 <p:sld xmlns:a="http://schemas.openxmlformats.org/drawingml/2006/main" xmlns:r="http://schemas.openxmlformats.org/officeDocument/2006/relationships" xmlns:p="http://schemas.openxmlformats.org/presentationml/2006/main">
   <p:cSld>
@@ -3540,8 +3524,24 @@
           <a:lstStyle/>
           <a:p>
             <a:r>
-              <a:rPr lang="de-CH" dirty="0" smtClean="0"/>
-              <a:t>Lösung</a:t>
+              <a:rPr lang="de-CH" dirty="0" err="1" smtClean="0"/>
+              <a:t>Implementation</a:t>
+            </a:r>
+            <a:r>
+              <a:rPr lang="de-CH" dirty="0" smtClean="0"/>
+              <a:t> </a:t>
+            </a:r>
+            <a:r>
+              <a:rPr lang="de-CH" dirty="0" smtClean="0"/>
+              <a:t>HL (</a:t>
+            </a:r>
+            <a:r>
+              <a:rPr lang="de-CH" dirty="0" err="1" smtClean="0"/>
+              <a:t>voice</a:t>
+            </a:r>
+            <a:r>
+              <a:rPr lang="de-CH" dirty="0" smtClean="0"/>
+              <a:t>)</a:t>
             </a:r>
             <a:endParaRPr lang="de-CH" dirty="0"/>
           </a:p>
@@ -3559,64 +3559,107 @@
         </p:nvSpPr>
         <p:spPr/>
         <p:txBody>
-          <a:bodyPr/>
-          <a:lstStyle/>
-          <a:p>
-            <a:r>
-              <a:rPr lang="de-CH" dirty="0" smtClean="0"/>
-              <a:t>Adaptives LMS-Filter</a:t>
+          <a:bodyPr>
+            <a:normAutofit/>
+          </a:bodyPr>
+          <a:lstStyle/>
+          <a:p>
+            <a:r>
+              <a:rPr lang="de-CH" dirty="0" err="1" smtClean="0"/>
+              <a:t>Lorem</a:t>
+            </a:r>
+            <a:r>
+              <a:rPr lang="de-CH" dirty="0" smtClean="0"/>
+              <a:t> </a:t>
+            </a:r>
+            <a:r>
+              <a:rPr lang="de-CH" dirty="0" err="1" smtClean="0"/>
+              <a:t>Ipsum</a:t>
+            </a:r>
+            <a:r>
+              <a:rPr lang="de-CH" dirty="0" smtClean="0"/>
+              <a:t>, 2*5 Sekunden hintereinander</a:t>
+            </a:r>
+            <a:endParaRPr lang="de-CH" dirty="0" smtClean="0"/>
+          </a:p>
+          <a:p>
+            <a:r>
+              <a:rPr lang="de-CH" dirty="0" smtClean="0"/>
+              <a:t>Echo ist eine Verzögerung um </a:t>
+            </a:r>
+            <a:r>
+              <a:rPr lang="de-CH" dirty="0" smtClean="0"/>
+              <a:t>1470 Samples (200ms bei einer Samplefrequenz von 7350Hz) </a:t>
+            </a:r>
+            <a:r>
+              <a:rPr lang="de-CH" dirty="0" smtClean="0"/>
+              <a:t>und Amplitude von 0.4:</a:t>
             </a:r>
           </a:p>
           <a:p>
             <a:pPr lvl="1"/>
             <a:r>
               <a:rPr lang="de-CH" dirty="0" smtClean="0"/>
-              <a:t>Das Signal y und das Signal y^ werden nun verglichen und auf das Filter zurückgeführt.</a:t>
+              <a:t>g = </a:t>
+            </a:r>
+            <a:r>
+              <a:rPr lang="de-CH" dirty="0" err="1" smtClean="0"/>
+              <a:t>zeros</a:t>
+            </a:r>
+            <a:r>
+              <a:rPr lang="de-CH" dirty="0" smtClean="0"/>
+              <a:t>(2000,1);   g</a:t>
+            </a:r>
+            <a:r>
+              <a:rPr lang="de-CH" dirty="0" smtClean="0"/>
+              <a:t>(1) </a:t>
+            </a:r>
+            <a:r>
+              <a:rPr lang="de-CH" dirty="0" smtClean="0"/>
+              <a:t>= </a:t>
+            </a:r>
+            <a:r>
+              <a:rPr lang="de-CH" dirty="0" smtClean="0"/>
+              <a:t>1;   g(1600) = 0.4;</a:t>
+            </a:r>
+            <a:endParaRPr lang="de-CH" dirty="0" smtClean="0"/>
+          </a:p>
+          <a:p>
+            <a:r>
+              <a:rPr lang="de-CH" dirty="0" smtClean="0"/>
+              <a:t>Konvergenzgeschwindigkeit ist abhängig von u</a:t>
             </a:r>
           </a:p>
           <a:p>
             <a:pPr lvl="1"/>
             <a:r>
               <a:rPr lang="de-CH" dirty="0" smtClean="0"/>
-              <a:t>Als Resultat sollte </a:t>
-            </a:r>
-            <a:r>
-              <a:rPr lang="de-CH" dirty="0" err="1" smtClean="0"/>
-              <a:t>optimalerweise</a:t>
-            </a:r>
-            <a:r>
-              <a:rPr lang="de-CH" dirty="0" smtClean="0"/>
-              <a:t> 0 herauskommen:</a:t>
-            </a:r>
-          </a:p>
-        </p:txBody>
-      </p:sp>
-      <p:pic>
-        <p:nvPicPr>
-          <p:cNvPr id="1026" name="Picture 2" descr="D:\BFH\DSV\EchoCancellation\Präsentation\err_Verlauf.png"/>
-          <p:cNvPicPr>
-            <a:picLocks noChangeAspect="1" noChangeArrowheads="1"/>
-          </p:cNvPicPr>
+              <a:t>u sollte                     nicht überschreiten</a:t>
+            </a:r>
+            <a:endParaRPr lang="de-CH" dirty="0" smtClean="0"/>
+          </a:p>
+        </p:txBody>
+      </p:sp>
+      <p:graphicFrame>
+        <p:nvGraphicFramePr>
+          <p:cNvPr id="1028" name="Object 4"/>
+          <p:cNvGraphicFramePr>
+            <a:graphicFrameLocks noChangeAspect="1"/>
+          </p:cNvGraphicFramePr>
           <p:nvPr/>
-        </p:nvPicPr>
-        <p:blipFill>
-          <a:blip r:embed="rId2" cstate="print"/>
-          <a:srcRect/>
-          <a:stretch>
-            <a:fillRect/>
-          </a:stretch>
-        </p:blipFill>
-        <p:spPr bwMode="auto">
-          <a:xfrm>
-            <a:off x="2393817" y="4005064"/>
-            <a:ext cx="3618343" cy="2708920"/>
-          </a:xfrm>
-          <a:prstGeom prst="rect">
-            <a:avLst/>
-          </a:prstGeom>
-          <a:noFill/>
-        </p:spPr>
-      </p:pic>
+        </p:nvGraphicFramePr>
+        <p:xfrm>
+          <a:off x="2411760" y="4743374"/>
+          <a:ext cx="1584176" cy="701850"/>
+        </p:xfrm>
+        <a:graphic>
+          <a:graphicData uri="http://schemas.openxmlformats.org/presentationml/2006/ole">
+            <p:oleObj spid="_x0000_s1028" name="Formel" r:id="rId3" imgW="1002960" imgH="444240" progId="Equation.3">
+              <p:embed/>
+            </p:oleObj>
+          </a:graphicData>
+        </a:graphic>
+      </p:graphicFrame>
     </p:spTree>
   </p:cSld>
   <p:clrMapOvr>
@@ -3666,15 +3709,64 @@
           <a:p>
             <a:r>
               <a:rPr lang="de-CH" dirty="0" smtClean="0"/>
-              <a:t>Lösung</a:t>
+              <a:t>Resultate </a:t>
+            </a:r>
+            <a:r>
+              <a:rPr lang="de-CH" dirty="0" smtClean="0"/>
+              <a:t>HL (</a:t>
+            </a:r>
+            <a:r>
+              <a:rPr lang="de-CH" dirty="0" err="1" smtClean="0"/>
+              <a:t>voice</a:t>
+            </a:r>
+            <a:r>
+              <a:rPr lang="de-CH" dirty="0" smtClean="0"/>
+              <a:t>)</a:t>
             </a:r>
             <a:endParaRPr lang="de-CH" dirty="0"/>
           </a:p>
         </p:txBody>
       </p:sp>
-      <p:sp>
-        <p:nvSpPr>
-          <p:cNvPr id="3" name="Inhaltsplatzhalter 2"/>
+      <p:pic>
+        <p:nvPicPr>
+          <p:cNvPr id="3074" name="Picture 2" descr="D:\BFH\DSV\EchoCancellation\Matlab\konvergenz_unstabil_3007-3420.png"/>
+          <p:cNvPicPr>
+            <a:picLocks noChangeAspect="1" noChangeArrowheads="1"/>
+          </p:cNvPicPr>
+          <p:nvPr/>
+        </p:nvPicPr>
+        <p:blipFill>
+          <a:blip r:embed="rId3" cstate="print">
+            <a:clrChange>
+              <a:clrFrom>
+                <a:srgbClr val="FFFFFF"/>
+              </a:clrFrom>
+              <a:clrTo>
+                <a:srgbClr val="FFFFFF">
+                  <a:alpha val="0"/>
+                </a:srgbClr>
+              </a:clrTo>
+            </a:clrChange>
+          </a:blip>
+          <a:srcRect/>
+          <a:stretch>
+            <a:fillRect/>
+          </a:stretch>
+        </p:blipFill>
+        <p:spPr bwMode="auto">
+          <a:xfrm>
+            <a:off x="971600" y="3356992"/>
+            <a:ext cx="7206416" cy="3616026"/>
+          </a:xfrm>
+          <a:prstGeom prst="rect">
+            <a:avLst/>
+          </a:prstGeom>
+          <a:noFill/>
+        </p:spPr>
+      </p:pic>
+      <p:sp>
+        <p:nvSpPr>
+          <p:cNvPr id="9" name="Inhaltsplatzhalter 2"/>
           <p:cNvSpPr>
             <a:spLocks noGrp="1"/>
           </p:cNvSpPr>
@@ -3682,162 +3774,89 @@
             <p:ph idx="1"/>
           </p:nvPr>
         </p:nvSpPr>
-        <p:spPr/>
-        <p:txBody>
-          <a:bodyPr/>
-          <a:lstStyle/>
-          <a:p>
-            <a:r>
-              <a:rPr lang="de-CH" dirty="0" smtClean="0"/>
-              <a:t>Echo </a:t>
-            </a:r>
-            <a:r>
-              <a:rPr lang="de-CH" dirty="0" err="1" smtClean="0"/>
-              <a:t>Cancellation</a:t>
-            </a:r>
-            <a:r>
-              <a:rPr lang="de-CH" dirty="0" smtClean="0"/>
-              <a:t> mit Adaptivem LMS-Filter</a:t>
-            </a:r>
-          </a:p>
-          <a:p>
-            <a:pPr lvl="1"/>
-            <a:r>
-              <a:rPr lang="de-CH" dirty="0" smtClean="0"/>
-              <a:t>Wenn nun das erste Filter-Tab ignoriert wird, erhält man als Resultat das Originalsignal, da nur noch das Echo nachgebildet und von y subtrahiert wird:</a:t>
-            </a:r>
-          </a:p>
-        </p:txBody>
-      </p:sp>
-      <p:grpSp>
-        <p:nvGrpSpPr>
-          <p:cNvPr id="8" name="Gruppieren 7"/>
-          <p:cNvGrpSpPr/>
+        <p:spPr>
+          <a:xfrm>
+            <a:off x="467544" y="1340768"/>
+            <a:ext cx="8229600" cy="4525963"/>
+          </a:xfrm>
+        </p:spPr>
+        <p:txBody>
+          <a:bodyPr>
+            <a:normAutofit/>
+          </a:bodyPr>
+          <a:lstStyle/>
+          <a:p>
+            <a:r>
+              <a:rPr lang="de-CH" dirty="0" smtClean="0"/>
+              <a:t>Sprachsignal</a:t>
+            </a:r>
+          </a:p>
+          <a:p>
+            <a:r>
+              <a:rPr lang="de-CH" dirty="0" smtClean="0"/>
+              <a:t>u </a:t>
+            </a:r>
+            <a:r>
+              <a:rPr lang="de-CH" dirty="0" smtClean="0"/>
+              <a:t>=</a:t>
+            </a:r>
+            <a:r>
+              <a:rPr lang="de-CH" dirty="0" smtClean="0"/>
+              <a:t> </a:t>
+            </a:r>
+            <a:r>
+              <a:rPr lang="de-CH" dirty="0" smtClean="0"/>
+              <a:t>                     = 0.1074</a:t>
+            </a:r>
+            <a:endParaRPr lang="de-CH" dirty="0" smtClean="0"/>
+          </a:p>
+          <a:p>
+            <a:r>
+              <a:rPr lang="de-CH" dirty="0" smtClean="0">
+                <a:sym typeface="Wingdings" pitchFamily="2" charset="2"/>
+              </a:rPr>
+              <a:t>u</a:t>
+            </a:r>
+            <a:r>
+              <a:rPr lang="de-CH" dirty="0" smtClean="0"/>
+              <a:t>nstabil! </a:t>
+            </a:r>
+            <a:r>
+              <a:rPr lang="de-CH" dirty="0" smtClean="0">
+                <a:sym typeface="Wingdings" pitchFamily="2" charset="2"/>
+              </a:rPr>
+              <a:t> die Varianz ist nur quasi-stationär</a:t>
+            </a:r>
+          </a:p>
+          <a:p>
+            <a:r>
+              <a:rPr lang="de-CH" dirty="0" smtClean="0"/>
+              <a:t>Wir haben ermittelt, ab wo das Filter „ausschlägt“:</a:t>
+            </a:r>
+            <a:endParaRPr lang="de-CH" dirty="0" smtClean="0"/>
+          </a:p>
+        </p:txBody>
+      </p:sp>
+      <p:graphicFrame>
+        <p:nvGraphicFramePr>
+          <p:cNvPr id="3075" name="Object 3"/>
+          <p:cNvGraphicFramePr>
+            <a:graphicFrameLocks noChangeAspect="1"/>
+          </p:cNvGraphicFramePr>
           <p:nvPr/>
-        </p:nvGrpSpPr>
-        <p:grpSpPr>
-          <a:xfrm>
-            <a:off x="2843808" y="3861048"/>
-            <a:ext cx="3527926" cy="2641228"/>
-            <a:chOff x="1691680" y="4005064"/>
-            <a:chExt cx="3527926" cy="2641228"/>
-          </a:xfrm>
-        </p:grpSpPr>
-        <p:pic>
-          <p:nvPicPr>
-            <p:cNvPr id="3074" name="Picture 2" descr="D:\BFH\DSV\EchoCancellation\Präsentation\g.png"/>
-            <p:cNvPicPr>
-              <a:picLocks noChangeAspect="1" noChangeArrowheads="1"/>
-            </p:cNvPicPr>
-            <p:nvPr/>
-          </p:nvPicPr>
-          <p:blipFill>
-            <a:blip r:embed="rId2" cstate="print"/>
-            <a:srcRect/>
-            <a:stretch>
-              <a:fillRect/>
-            </a:stretch>
-          </p:blipFill>
-          <p:spPr bwMode="auto">
-            <a:xfrm>
-              <a:off x="1691680" y="4005064"/>
-              <a:ext cx="3527926" cy="2641228"/>
-            </a:xfrm>
-            <a:prstGeom prst="rect">
-              <a:avLst/>
-            </a:prstGeom>
-            <a:noFill/>
-          </p:spPr>
-        </p:pic>
-        <p:sp>
-          <p:nvSpPr>
-            <p:cNvPr id="6" name="Multiplizieren 5"/>
-            <p:cNvSpPr/>
-            <p:nvPr/>
-          </p:nvSpPr>
-          <p:spPr>
-            <a:xfrm>
-              <a:off x="1907704" y="5122688"/>
-              <a:ext cx="720080" cy="720080"/>
-            </a:xfrm>
-            <a:prstGeom prst="mathMultiply">
-              <a:avLst>
-                <a:gd name="adj1" fmla="val 8973"/>
-              </a:avLst>
-            </a:prstGeom>
-          </p:spPr>
-          <p:style>
-            <a:lnRef idx="2">
-              <a:schemeClr val="accent2">
-                <a:shade val="50000"/>
-              </a:schemeClr>
-            </a:lnRef>
-            <a:fillRef idx="1">
-              <a:schemeClr val="accent2"/>
-            </a:fillRef>
-            <a:effectRef idx="0">
-              <a:schemeClr val="accent2"/>
-            </a:effectRef>
-            <a:fontRef idx="minor">
-              <a:schemeClr val="lt1"/>
-            </a:fontRef>
-          </p:style>
-          <p:txBody>
-            <a:bodyPr rtlCol="0" anchor="ctr"/>
-            <a:lstStyle/>
-            <a:p>
-              <a:pPr algn="ctr"/>
-              <a:endParaRPr lang="de-CH"/>
-            </a:p>
-          </p:txBody>
-        </p:sp>
-        <p:sp>
-          <p:nvSpPr>
-            <p:cNvPr id="7" name="Rad 6"/>
-            <p:cNvSpPr/>
-            <p:nvPr/>
-          </p:nvSpPr>
-          <p:spPr>
-            <a:xfrm>
-              <a:off x="2987824" y="5229200"/>
-              <a:ext cx="504056" cy="504056"/>
-            </a:xfrm>
-            <a:prstGeom prst="donut">
-              <a:avLst>
-                <a:gd name="adj" fmla="val 12662"/>
-              </a:avLst>
-            </a:prstGeom>
-          </p:spPr>
-          <p:style>
-            <a:lnRef idx="2">
-              <a:schemeClr val="accent3">
-                <a:shade val="50000"/>
-              </a:schemeClr>
-            </a:lnRef>
-            <a:fillRef idx="1">
-              <a:schemeClr val="accent3"/>
-            </a:fillRef>
-            <a:effectRef idx="0">
-              <a:schemeClr val="accent3"/>
-            </a:effectRef>
-            <a:fontRef idx="minor">
-              <a:schemeClr val="lt1"/>
-            </a:fontRef>
-          </p:style>
-          <p:txBody>
-            <a:bodyPr rtlCol="0" anchor="ctr"/>
-            <a:lstStyle/>
-            <a:p>
-              <a:pPr algn="ctr"/>
-              <a:endParaRPr lang="de-CH">
-                <a:solidFill>
-                  <a:schemeClr val="tx1"/>
-                </a:solidFill>
-              </a:endParaRPr>
-            </a:p>
-          </p:txBody>
-        </p:sp>
-      </p:grpSp>
+        </p:nvGraphicFramePr>
+        <p:xfrm>
+          <a:off x="1475656" y="1844824"/>
+          <a:ext cx="1909501" cy="845691"/>
+        </p:xfrm>
+        <a:graphic>
+          <a:graphicData uri="http://schemas.openxmlformats.org/presentationml/2006/ole">
+            <p:oleObj spid="_x0000_s3075" name="Formel" r:id="rId4" imgW="1002960" imgH="444240" progId="Equation.3">
+              <p:embed/>
+            </p:oleObj>
+          </a:graphicData>
+        </a:graphic>
+      </p:graphicFrame>
     </p:spTree>
   </p:cSld>
   <p:clrMapOvr>
@@ -3886,12 +3905,20 @@
           <a:lstStyle/>
           <a:p>
             <a:r>
+              <a:rPr lang="de-CH" dirty="0" smtClean="0"/>
+              <a:t>Resultate </a:t>
+            </a:r>
+            <a:r>
+              <a:rPr lang="de-CH" dirty="0" smtClean="0"/>
+              <a:t>HL (</a:t>
+            </a:r>
+            <a:r>
               <a:rPr lang="de-CH" dirty="0" err="1" smtClean="0"/>
-              <a:t>Implementation</a:t>
-            </a:r>
-            <a:r>
-              <a:rPr lang="de-CH" dirty="0" smtClean="0"/>
-              <a:t> HL</a:t>
+              <a:t>voice</a:t>
+            </a:r>
+            <a:r>
+              <a:rPr lang="de-CH" dirty="0" smtClean="0"/>
+              <a:t>)</a:t>
             </a:r>
             <a:endParaRPr lang="de-CH" dirty="0"/>
           </a:p>
@@ -3899,7 +3926,7 @@
       </p:sp>
       <p:sp>
         <p:nvSpPr>
-          <p:cNvPr id="3" name="Inhaltsplatzhalter 2"/>
+          <p:cNvPr id="9" name="Inhaltsplatzhalter 2"/>
           <p:cNvSpPr>
             <a:spLocks noGrp="1"/>
           </p:cNvSpPr>
@@ -3907,51 +3934,91 @@
             <p:ph idx="1"/>
           </p:nvPr>
         </p:nvSpPr>
-        <p:spPr/>
-        <p:txBody>
-          <a:bodyPr/>
-          <a:lstStyle/>
-          <a:p>
-            <a:r>
-              <a:rPr lang="de-CH" dirty="0" smtClean="0"/>
-              <a:t>Weisses Rauschen</a:t>
-            </a:r>
-          </a:p>
-          <a:p>
-            <a:r>
-              <a:rPr lang="de-CH" dirty="0" smtClean="0"/>
-              <a:t>Echo ist eine Verzögerung um 8 Samples und Amplitude von 0.4:</a:t>
-            </a:r>
-          </a:p>
-          <a:p>
-            <a:pPr lvl="1"/>
-            <a:r>
-              <a:rPr lang="de-CH" dirty="0" smtClean="0"/>
-              <a:t>g = [1 0 0 0 0 0 0 0.4]</a:t>
-            </a:r>
-          </a:p>
-          <a:p>
-            <a:r>
-              <a:rPr lang="de-CH" dirty="0" smtClean="0"/>
-              <a:t>Konvergenzgeschwindigkeit ist abhängig von u</a:t>
-            </a:r>
-          </a:p>
-          <a:p>
-            <a:pPr lvl="1"/>
-            <a:r>
-              <a:rPr lang="de-CH" dirty="0" smtClean="0"/>
-              <a:t>u klein: genau aber langsam</a:t>
-            </a:r>
-          </a:p>
-          <a:p>
-            <a:pPr lvl="1"/>
-            <a:r>
-              <a:rPr lang="de-CH" dirty="0" smtClean="0"/>
-              <a:t>u gross: schnell aber ungenau (und evtl. unstabil)</a:t>
-            </a:r>
-          </a:p>
-        </p:txBody>
-      </p:sp>
+        <p:spPr>
+          <a:xfrm>
+            <a:off x="467544" y="1340768"/>
+            <a:ext cx="8229600" cy="4525963"/>
+          </a:xfrm>
+        </p:spPr>
+        <p:txBody>
+          <a:bodyPr>
+            <a:normAutofit/>
+          </a:bodyPr>
+          <a:lstStyle/>
+          <a:p>
+            <a:r>
+              <a:rPr lang="de-CH" dirty="0" smtClean="0"/>
+              <a:t>Die </a:t>
+            </a:r>
+            <a:r>
+              <a:rPr lang="de-CH" dirty="0" smtClean="0"/>
+              <a:t>Varianz dort lokal </a:t>
+            </a:r>
+            <a:r>
+              <a:rPr lang="de-CH" dirty="0" smtClean="0"/>
+              <a:t>bestimmt und noch einmal                      ausgerechnet = </a:t>
+            </a:r>
+            <a:r>
+              <a:rPr lang="de-CH" b="1" dirty="0" smtClean="0"/>
+              <a:t>0.0241</a:t>
+            </a:r>
+          </a:p>
+          <a:p>
+            <a:r>
+              <a:rPr lang="de-CH" dirty="0" smtClean="0"/>
+              <a:t>Interessant: Bei empirischem Anpassen des Konvergenzparameters erhielten wir noch bis </a:t>
+            </a:r>
+            <a:r>
+              <a:rPr lang="de-CH" b="1" dirty="0" smtClean="0"/>
+              <a:t>0.0284</a:t>
+            </a:r>
+            <a:r>
+              <a:rPr lang="de-CH" dirty="0" smtClean="0"/>
+              <a:t> stabile Resultate</a:t>
+            </a:r>
+          </a:p>
+          <a:p>
+            <a:r>
+              <a:rPr lang="de-CH" dirty="0" smtClean="0"/>
+              <a:t>Recht nahe beieinander</a:t>
+            </a:r>
+          </a:p>
+          <a:p>
+            <a:r>
+              <a:rPr lang="de-CH" dirty="0" smtClean="0"/>
+              <a:t>Resultat bei stabiler Echo-</a:t>
+            </a:r>
+            <a:r>
+              <a:rPr lang="de-CH" dirty="0" err="1" smtClean="0"/>
+              <a:t>Cancellation</a:t>
+            </a:r>
+            <a:r>
+              <a:rPr lang="de-CH" dirty="0" smtClean="0"/>
+              <a:t>:</a:t>
+            </a:r>
+          </a:p>
+        </p:txBody>
+      </p:sp>
+      <p:graphicFrame>
+        <p:nvGraphicFramePr>
+          <p:cNvPr id="3075" name="Object 3"/>
+          <p:cNvGraphicFramePr>
+            <a:graphicFrameLocks noChangeAspect="1"/>
+          </p:cNvGraphicFramePr>
+          <p:nvPr/>
+        </p:nvGraphicFramePr>
+        <p:xfrm>
+          <a:off x="2123728" y="1772817"/>
+          <a:ext cx="1765485" cy="781908"/>
+        </p:xfrm>
+        <a:graphic>
+          <a:graphicData uri="http://schemas.openxmlformats.org/presentationml/2006/ole">
+            <p:oleObj spid="_x0000_s4098" name="Formel" r:id="rId3" imgW="1002960" imgH="444240" progId="Equation.3">
+              <p:embed/>
+            </p:oleObj>
+          </a:graphicData>
+        </a:graphic>
+      </p:graphicFrame>
     </p:spTree>
   </p:cSld>
   <p:clrMapOvr>
@@ -4005,15 +4072,74 @@
             </a:r>
             <a:r>
               <a:rPr lang="de-CH" dirty="0" smtClean="0"/>
-              <a:t>HL (Noise)</a:t>
+              <a:t>HL (</a:t>
+            </a:r>
+            <a:r>
+              <a:rPr lang="de-CH" dirty="0" err="1" smtClean="0"/>
+              <a:t>voice</a:t>
+            </a:r>
+            <a:r>
+              <a:rPr lang="de-CH" dirty="0" smtClean="0"/>
+              <a:t>)</a:t>
             </a:r>
             <a:endParaRPr lang="de-CH" dirty="0"/>
+          </a:p>
+        </p:txBody>
+      </p:sp>
+      <p:sp>
+        <p:nvSpPr>
+          <p:cNvPr id="6" name="Textfeld 5"/>
+          <p:cNvSpPr txBox="1"/>
+          <p:nvPr/>
+        </p:nvSpPr>
+        <p:spPr>
+          <a:xfrm>
+            <a:off x="251520" y="5373216"/>
+            <a:ext cx="5688632" cy="1077218"/>
+          </a:xfrm>
+          <a:prstGeom prst="rect">
+            <a:avLst/>
+          </a:prstGeom>
+          <a:noFill/>
+          <a:ln>
+            <a:noFill/>
+          </a:ln>
+        </p:spPr>
+        <p:txBody>
+          <a:bodyPr wrap="square" rtlCol="0">
+            <a:spAutoFit/>
+          </a:bodyPr>
+          <a:lstStyle/>
+          <a:p>
+            <a:pPr>
+              <a:buFont typeface="Arial" pitchFamily="34" charset="0"/>
+              <a:buChar char="•"/>
+            </a:pPr>
+            <a:r>
+              <a:rPr lang="de-CH" sz="3200" dirty="0" smtClean="0"/>
+              <a:t>Sprachsignal</a:t>
+            </a:r>
+          </a:p>
+          <a:p>
+            <a:pPr>
+              <a:buFont typeface="Arial" pitchFamily="34" charset="0"/>
+              <a:buChar char="•"/>
+            </a:pPr>
+            <a:r>
+              <a:rPr lang="de-CH" sz="3200" dirty="0" smtClean="0"/>
+              <a:t>u = </a:t>
+            </a:r>
+            <a:r>
+              <a:rPr lang="de-CH" sz="3200" dirty="0" smtClean="0"/>
+              <a:t>0.0285 (empirisch)</a:t>
+            </a:r>
+            <a:endParaRPr lang="de-CH" sz="3200" dirty="0"/>
           </a:p>
         </p:txBody>
       </p:sp>
       <p:pic>
         <p:nvPicPr>
-          <p:cNvPr id="16386" name="Picture 2" descr="D:\BFH\DSV\EchoCancellation\Präsentation\Konvergenz_u_tief_0.00008.png"/>
+          <p:cNvPr id="2050" name="Picture 2" descr="D:\BFH\DSV\EchoCancellation\Matlab\konvergenz_stabil.png"/>
           <p:cNvPicPr>
             <a:picLocks noChangeAspect="1" noChangeArrowheads="1"/>
           </p:cNvPicPr>
@@ -4028,8 +4154,8 @@
         </p:blipFill>
         <p:spPr bwMode="auto">
           <a:xfrm>
-            <a:off x="-324544" y="1196752"/>
-            <a:ext cx="7920880" cy="3974530"/>
+            <a:off x="-612576" y="1196752"/>
+            <a:ext cx="7892802" cy="3960440"/>
           </a:xfrm>
           <a:prstGeom prst="rect">
             <a:avLst/>
@@ -4039,14 +4165,25 @@
       </p:pic>
       <p:pic>
         <p:nvPicPr>
-          <p:cNvPr id="16387" name="Picture 3" descr="D:\BFH\DSV\EchoCancellation\Präsentation\Koeffizienten_u_tief_0.00008.png"/>
+          <p:cNvPr id="2051" name="Picture 3" descr="D:\BFH\DSV\EchoCancellation\Matlab\konvergenz_stabil_end.png"/>
           <p:cNvPicPr>
             <a:picLocks noChangeAspect="1" noChangeArrowheads="1"/>
           </p:cNvPicPr>
           <p:nvPr/>
         </p:nvPicPr>
         <p:blipFill>
-          <a:blip r:embed="rId3" cstate="print"/>
+          <a:blip r:embed="rId3" cstate="print">
+            <a:clrChange>
+              <a:clrFrom>
+                <a:srgbClr val="FFFFFF"/>
+              </a:clrFrom>
+              <a:clrTo>
+                <a:srgbClr val="FFFFFF">
+                  <a:alpha val="0"/>
+                </a:srgbClr>
+              </a:clrTo>
+            </a:clrChange>
+          </a:blip>
           <a:srcRect/>
           <a:stretch>
             <a:fillRect/>
@@ -4054,8 +4191,8 @@
         </p:blipFill>
         <p:spPr bwMode="auto">
           <a:xfrm>
-            <a:off x="5874889" y="4437112"/>
-            <a:ext cx="3233615" cy="2420888"/>
+            <a:off x="5406802" y="4224973"/>
+            <a:ext cx="3773710" cy="2732419"/>
           </a:xfrm>
           <a:prstGeom prst="rect">
             <a:avLst/>
@@ -4063,50 +4200,187 @@
           <a:noFill/>
         </p:spPr>
       </p:pic>
-      <p:sp>
-        <p:nvSpPr>
-          <p:cNvPr id="6" name="Textfeld 5"/>
-          <p:cNvSpPr txBox="1"/>
+      <p:pic>
+        <p:nvPicPr>
+          <p:cNvPr id="2052" name="Picture 4" descr="D:\BFH\DSV\EchoCancellation\Matlab\konvergenz_stabil_end_zoom.png"/>
+          <p:cNvPicPr>
+            <a:picLocks noChangeAspect="1" noChangeArrowheads="1"/>
+          </p:cNvPicPr>
           <p:nvPr/>
-        </p:nvSpPr>
-        <p:spPr>
+        </p:nvPicPr>
+        <p:blipFill>
+          <a:blip r:embed="rId4" cstate="print"/>
+          <a:srcRect l="36015" t="5454" r="28558" b="3237"/>
+          <a:stretch>
+            <a:fillRect/>
+          </a:stretch>
+        </p:blipFill>
+        <p:spPr bwMode="auto">
           <a:xfrm>
-            <a:off x="251520" y="5373216"/>
-            <a:ext cx="5688632" cy="1077218"/>
+            <a:off x="6987396" y="1492370"/>
+            <a:ext cx="2044461" cy="2380890"/>
           </a:xfrm>
           <a:prstGeom prst="rect">
             <a:avLst/>
           </a:prstGeom>
-          <a:noFill/>
           <a:ln>
             <a:noFill/>
           </a:ln>
+          <a:effectLst>
+            <a:softEdge rad="112500"/>
+          </a:effectLst>
         </p:spPr>
-        <p:txBody>
-          <a:bodyPr wrap="square" rtlCol="0">
-            <a:spAutoFit/>
-          </a:bodyPr>
-          <a:lstStyle/>
-          <a:p>
-            <a:pPr>
-              <a:buFont typeface="Arial" pitchFamily="34" charset="0"/>
-              <a:buChar char="•"/>
-            </a:pPr>
-            <a:r>
-              <a:rPr lang="de-CH" sz="3200" dirty="0" smtClean="0"/>
-              <a:t>Weisses Rauschen</a:t>
-            </a:r>
-          </a:p>
-          <a:p>
-            <a:pPr>
-              <a:buFont typeface="Arial" pitchFamily="34" charset="0"/>
-              <a:buChar char="•"/>
-            </a:pPr>
-            <a:r>
-              <a:rPr lang="de-CH" sz="3200" dirty="0" smtClean="0"/>
-              <a:t>u = 0.00008 (klein)</a:t>
-            </a:r>
-            <a:endParaRPr lang="de-CH" sz="3200" dirty="0"/>
+      </p:pic>
+      <p:sp>
+        <p:nvSpPr>
+          <p:cNvPr id="9" name="Ellipse 8"/>
+          <p:cNvSpPr/>
+          <p:nvPr/>
+        </p:nvSpPr>
+        <p:spPr>
+          <a:xfrm>
+            <a:off x="7901620" y="5568988"/>
+            <a:ext cx="288032" cy="1080120"/>
+          </a:xfrm>
+          <a:prstGeom prst="ellipse">
+            <a:avLst/>
+          </a:prstGeom>
+          <a:noFill/>
+        </p:spPr>
+        <p:style>
+          <a:lnRef idx="2">
+            <a:schemeClr val="accent2"/>
+          </a:lnRef>
+          <a:fillRef idx="1">
+            <a:schemeClr val="lt1"/>
+          </a:fillRef>
+          <a:effectRef idx="0">
+            <a:schemeClr val="accent2"/>
+          </a:effectRef>
+          <a:fontRef idx="minor">
+            <a:schemeClr val="dk1"/>
+          </a:fontRef>
+        </p:style>
+        <p:txBody>
+          <a:bodyPr rtlCol="0" anchor="ctr"/>
+          <a:lstStyle/>
+          <a:p>
+            <a:pPr algn="ctr"/>
+            <a:endParaRPr lang="de-CH"/>
+          </a:p>
+        </p:txBody>
+      </p:sp>
+      <p:sp>
+        <p:nvSpPr>
+          <p:cNvPr id="11" name="Ellipse 10"/>
+          <p:cNvSpPr/>
+          <p:nvPr/>
+        </p:nvSpPr>
+        <p:spPr>
+          <a:xfrm>
+            <a:off x="6588224" y="1268760"/>
+            <a:ext cx="2880320" cy="2880320"/>
+          </a:xfrm>
+          <a:prstGeom prst="ellipse">
+            <a:avLst/>
+          </a:prstGeom>
+          <a:noFill/>
+        </p:spPr>
+        <p:style>
+          <a:lnRef idx="2">
+            <a:schemeClr val="accent2"/>
+          </a:lnRef>
+          <a:fillRef idx="1">
+            <a:schemeClr val="lt1"/>
+          </a:fillRef>
+          <a:effectRef idx="0">
+            <a:schemeClr val="accent2"/>
+          </a:effectRef>
+          <a:fontRef idx="minor">
+            <a:schemeClr val="dk1"/>
+          </a:fontRef>
+        </p:style>
+        <p:txBody>
+          <a:bodyPr rtlCol="0" anchor="ctr"/>
+          <a:lstStyle/>
+          <a:p>
+            <a:pPr algn="ctr"/>
+            <a:endParaRPr lang="de-CH"/>
+          </a:p>
+        </p:txBody>
+      </p:sp>
+      <p:cxnSp>
+        <p:nvCxnSpPr>
+          <p:cNvPr id="13" name="Gerade Verbindung mit Pfeil 12"/>
+          <p:cNvCxnSpPr>
+            <a:stCxn id="9" idx="0"/>
+            <a:endCxn id="11" idx="4"/>
+          </p:cNvCxnSpPr>
+          <p:nvPr/>
+        </p:nvCxnSpPr>
+        <p:spPr>
+          <a:xfrm flipH="1" flipV="1">
+            <a:off x="8028384" y="4149080"/>
+            <a:ext cx="17252" cy="1419908"/>
+          </a:xfrm>
+          <a:prstGeom prst="straightConnector1">
+            <a:avLst/>
+          </a:prstGeom>
+          <a:ln w="28575">
+            <a:tailEnd type="arrow"/>
+          </a:ln>
+        </p:spPr>
+        <p:style>
+          <a:lnRef idx="1">
+            <a:schemeClr val="accent2"/>
+          </a:lnRef>
+          <a:fillRef idx="0">
+            <a:schemeClr val="accent2"/>
+          </a:fillRef>
+          <a:effectRef idx="0">
+            <a:schemeClr val="accent2"/>
+          </a:effectRef>
+          <a:fontRef idx="minor">
+            <a:schemeClr val="tx1"/>
+          </a:fontRef>
+        </p:style>
+      </p:cxnSp>
+      <p:sp>
+        <p:nvSpPr>
+          <p:cNvPr id="14" name="Ellipse 13"/>
+          <p:cNvSpPr/>
+          <p:nvPr/>
+        </p:nvSpPr>
+        <p:spPr>
+          <a:xfrm>
+            <a:off x="5750006" y="6335198"/>
+            <a:ext cx="432048" cy="432048"/>
+          </a:xfrm>
+          <a:prstGeom prst="ellipse">
+            <a:avLst/>
+          </a:prstGeom>
+          <a:noFill/>
+        </p:spPr>
+        <p:style>
+          <a:lnRef idx="2">
+            <a:schemeClr val="accent6"/>
+          </a:lnRef>
+          <a:fillRef idx="1">
+            <a:schemeClr val="lt1"/>
+          </a:fillRef>
+          <a:effectRef idx="0">
+            <a:schemeClr val="accent6"/>
+          </a:effectRef>
+          <a:fontRef idx="minor">
+            <a:schemeClr val="dk1"/>
+          </a:fontRef>
+        </p:style>
+        <p:txBody>
+          <a:bodyPr rtlCol="0" anchor="ctr"/>
+          <a:lstStyle/>
+          <a:p>
+            <a:pPr algn="ctr"/>
+            <a:endParaRPr lang="de-CH"/>
           </a:p>
         </p:txBody>
       </p:sp>
@@ -4163,11 +4437,15 @@
             </a:r>
             <a:r>
               <a:rPr lang="de-CH" dirty="0" smtClean="0"/>
-              <a:t>HL </a:t>
-            </a:r>
-            <a:r>
-              <a:rPr lang="de-CH" smtClean="0"/>
-              <a:t>(Noise)</a:t>
+              <a:t>HL (</a:t>
+            </a:r>
+            <a:r>
+              <a:rPr lang="de-CH" dirty="0" err="1" smtClean="0"/>
+              <a:t>voice</a:t>
+            </a:r>
+            <a:r>
+              <a:rPr lang="de-CH" dirty="0" smtClean="0"/>
+              <a:t>)</a:t>
             </a:r>
             <a:endParaRPr lang="de-CH" dirty="0"/>
           </a:p>
@@ -4175,254 +4453,36 @@
       </p:sp>
       <p:sp>
         <p:nvSpPr>
-          <p:cNvPr id="6" name="Textfeld 5"/>
-          <p:cNvSpPr txBox="1"/>
-          <p:nvPr/>
+          <p:cNvPr id="9" name="Inhaltsplatzhalter 2"/>
+          <p:cNvSpPr>
+            <a:spLocks noGrp="1"/>
+          </p:cNvSpPr>
+          <p:nvPr>
+            <p:ph idx="1"/>
+          </p:nvPr>
         </p:nvSpPr>
         <p:spPr>
           <a:xfrm>
-            <a:off x="251520" y="5373216"/>
-            <a:ext cx="5688632" cy="1077218"/>
+            <a:off x="467544" y="1340768"/>
+            <a:ext cx="8229600" cy="4525963"/>
           </a:xfrm>
-          <a:prstGeom prst="rect">
-            <a:avLst/>
-          </a:prstGeom>
-          <a:noFill/>
-          <a:ln>
-            <a:noFill/>
-          </a:ln>
         </p:spPr>
         <p:txBody>
-          <a:bodyPr wrap="square" rtlCol="0">
-            <a:spAutoFit/>
+          <a:bodyPr>
+            <a:normAutofit/>
           </a:bodyPr>
           <a:lstStyle/>
           <a:p>
-            <a:pPr>
-              <a:buFont typeface="Arial" pitchFamily="34" charset="0"/>
-              <a:buChar char="•"/>
-            </a:pPr>
-            <a:r>
-              <a:rPr lang="de-CH" sz="3200" dirty="0" smtClean="0"/>
-              <a:t>Weisses Rauschen</a:t>
-            </a:r>
-          </a:p>
-          <a:p>
-            <a:pPr>
-              <a:buFont typeface="Arial" pitchFamily="34" charset="0"/>
-              <a:buChar char="•"/>
-            </a:pPr>
-            <a:r>
-              <a:rPr lang="de-CH" sz="3200" dirty="0" smtClean="0"/>
-              <a:t>u = 0.008 (gross)</a:t>
-            </a:r>
-            <a:endParaRPr lang="de-CH" sz="3200" dirty="0"/>
-          </a:p>
-        </p:txBody>
-      </p:sp>
-      <p:pic>
-        <p:nvPicPr>
-          <p:cNvPr id="17410" name="Picture 2" descr="D:\BFH\DSV\EchoCancellation\Präsentation\Konvergenz_u_hoch_0.008.png"/>
-          <p:cNvPicPr>
-            <a:picLocks noChangeAspect="1" noChangeArrowheads="1"/>
-          </p:cNvPicPr>
-          <p:nvPr/>
-        </p:nvPicPr>
-        <p:blipFill>
-          <a:blip r:embed="rId2" cstate="print"/>
-          <a:srcRect/>
-          <a:stretch>
-            <a:fillRect/>
-          </a:stretch>
-        </p:blipFill>
-        <p:spPr bwMode="auto">
-          <a:xfrm>
-            <a:off x="-324544" y="1196752"/>
-            <a:ext cx="7892800" cy="3960439"/>
-          </a:xfrm>
-          <a:prstGeom prst="rect">
-            <a:avLst/>
-          </a:prstGeom>
-          <a:noFill/>
-        </p:spPr>
-      </p:pic>
-      <p:pic>
-        <p:nvPicPr>
-          <p:cNvPr id="17411" name="Picture 3" descr="D:\BFH\DSV\EchoCancellation\Präsentation\Koeffizienten_u_hoch_0.008.png"/>
-          <p:cNvPicPr>
-            <a:picLocks noChangeAspect="1" noChangeArrowheads="1"/>
-          </p:cNvPicPr>
-          <p:nvPr/>
-        </p:nvPicPr>
-        <p:blipFill>
-          <a:blip r:embed="rId3" cstate="print"/>
-          <a:srcRect/>
-          <a:stretch>
-            <a:fillRect/>
-          </a:stretch>
-        </p:blipFill>
-        <p:spPr bwMode="auto">
-          <a:xfrm>
-            <a:off x="5868144" y="4432872"/>
-            <a:ext cx="3275856" cy="2452512"/>
-          </a:xfrm>
-          <a:prstGeom prst="rect">
-            <a:avLst/>
-          </a:prstGeom>
-          <a:noFill/>
-        </p:spPr>
-      </p:pic>
-    </p:spTree>
-  </p:cSld>
-  <p:clrMapOvr>
-    <a:masterClrMapping/>
-  </p:clrMapOvr>
-  <p:timing>
-    <p:tnLst>
-      <p:par>
-        <p:cTn id="1" dur="indefinite" restart="never" nodeType="tmRoot"/>
-      </p:par>
-    </p:tnLst>
-  </p:timing>
-</p:sld>
-</file>
-
-<file path=ppt/slides/slide9.xml><?xml version="1.0" encoding="utf-8"?>
-<p:sld xmlns:a="http://schemas.openxmlformats.org/drawingml/2006/main" xmlns:r="http://schemas.openxmlformats.org/officeDocument/2006/relationships" xmlns:p="http://schemas.openxmlformats.org/presentationml/2006/main">
-  <p:cSld>
-    <p:spTree>
-      <p:nvGrpSpPr>
-        <p:cNvPr id="1" name=""/>
-        <p:cNvGrpSpPr/>
-        <p:nvPr/>
-      </p:nvGrpSpPr>
-      <p:grpSpPr>
-        <a:xfrm>
-          <a:off x="0" y="0"/>
-          <a:ext cx="0" cy="0"/>
-          <a:chOff x="0" y="0"/>
-          <a:chExt cx="0" cy="0"/>
-        </a:xfrm>
-      </p:grpSpPr>
-      <p:sp>
-        <p:nvSpPr>
-          <p:cNvPr id="2" name="Titel 1"/>
-          <p:cNvSpPr>
-            <a:spLocks noGrp="1"/>
-          </p:cNvSpPr>
-          <p:nvPr>
-            <p:ph type="title"/>
-          </p:nvPr>
-        </p:nvSpPr>
-        <p:spPr/>
-        <p:txBody>
-          <a:bodyPr/>
-          <a:lstStyle/>
-          <a:p>
-            <a:r>
-              <a:rPr lang="de-CH" dirty="0" smtClean="0"/>
-              <a:t>Resultate HL</a:t>
-            </a:r>
-            <a:endParaRPr lang="de-CH" dirty="0"/>
-          </a:p>
-        </p:txBody>
-      </p:sp>
-      <p:pic>
-        <p:nvPicPr>
-          <p:cNvPr id="16386" name="Picture 2" descr="D:\BFH\DSV\EchoCancellation\Präsentation\Konvergenz_u_tief_0.00008.png"/>
-          <p:cNvPicPr>
-            <a:picLocks noChangeAspect="1" noChangeArrowheads="1"/>
-          </p:cNvPicPr>
-          <p:nvPr/>
-        </p:nvPicPr>
-        <p:blipFill>
-          <a:blip r:embed="rId2" cstate="print"/>
-          <a:srcRect/>
-          <a:stretch>
-            <a:fillRect/>
-          </a:stretch>
-        </p:blipFill>
-        <p:spPr bwMode="auto">
-          <a:xfrm>
-            <a:off x="-324544" y="1196752"/>
-            <a:ext cx="7920880" cy="3974530"/>
-          </a:xfrm>
-          <a:prstGeom prst="rect">
-            <a:avLst/>
-          </a:prstGeom>
-          <a:noFill/>
-        </p:spPr>
-      </p:pic>
-      <p:pic>
-        <p:nvPicPr>
-          <p:cNvPr id="16387" name="Picture 3" descr="D:\BFH\DSV\EchoCancellation\Präsentation\Koeffizienten_u_tief_0.00008.png"/>
-          <p:cNvPicPr>
-            <a:picLocks noChangeAspect="1" noChangeArrowheads="1"/>
-          </p:cNvPicPr>
-          <p:nvPr/>
-        </p:nvPicPr>
-        <p:blipFill>
-          <a:blip r:embed="rId3" cstate="print"/>
-          <a:srcRect/>
-          <a:stretch>
-            <a:fillRect/>
-          </a:stretch>
-        </p:blipFill>
-        <p:spPr bwMode="auto">
-          <a:xfrm>
-            <a:off x="5874889" y="4437112"/>
-            <a:ext cx="3233615" cy="2420888"/>
-          </a:xfrm>
-          <a:prstGeom prst="rect">
-            <a:avLst/>
-          </a:prstGeom>
-          <a:noFill/>
-        </p:spPr>
-      </p:pic>
-      <p:sp>
-        <p:nvSpPr>
-          <p:cNvPr id="6" name="Textfeld 5"/>
-          <p:cNvSpPr txBox="1"/>
-          <p:nvPr/>
-        </p:nvSpPr>
-        <p:spPr>
-          <a:xfrm>
-            <a:off x="251520" y="5373216"/>
-            <a:ext cx="5688632" cy="1077218"/>
-          </a:xfrm>
-          <a:prstGeom prst="rect">
-            <a:avLst/>
-          </a:prstGeom>
-          <a:noFill/>
-          <a:ln>
-            <a:noFill/>
-          </a:ln>
-        </p:spPr>
-        <p:txBody>
-          <a:bodyPr wrap="square" rtlCol="0">
-            <a:spAutoFit/>
-          </a:bodyPr>
-          <a:lstStyle/>
-          <a:p>
-            <a:pPr>
-              <a:buFont typeface="Arial" pitchFamily="34" charset="0"/>
-              <a:buChar char="•"/>
-            </a:pPr>
-            <a:r>
-              <a:rPr lang="de-CH" sz="3200" dirty="0" smtClean="0"/>
-              <a:t>Sprachsignal</a:t>
-            </a:r>
-          </a:p>
-          <a:p>
-            <a:pPr>
-              <a:buFont typeface="Arial" pitchFamily="34" charset="0"/>
-              <a:buChar char="•"/>
-            </a:pPr>
-            <a:r>
-              <a:rPr lang="de-CH" sz="3200" dirty="0" smtClean="0"/>
-              <a:t>u = 0.00008 (klein)</a:t>
-            </a:r>
-            <a:endParaRPr lang="de-CH" sz="3200" dirty="0"/>
+            <a:r>
+              <a:rPr lang="de-CH" dirty="0" smtClean="0"/>
+              <a:t>Leider nur ca. 60% des Echos herausgefiltert</a:t>
+            </a:r>
+          </a:p>
+          <a:p>
+            <a:r>
+              <a:rPr lang="de-CH" dirty="0" smtClean="0"/>
+              <a:t>Relativ schnell: nach 2 Sekunden ist ca. 80% dieser Filterung erreicht</a:t>
+            </a:r>
           </a:p>
         </p:txBody>
       </p:sp>

</xml_diff>